<commit_message>
rename to set_theory with extensive editsp edit sets too
</commit_message>
<xml_diff>
--- a/spring11/slides11/slides2w.pptx
+++ b/spring11/slides11/slides2w.pptx
@@ -11955,16 +11955,7 @@
                 </a:solidFill>
                 <a:latin typeface="Comic Sans MS" pitchFamily="66" charset="0"/>
               </a:rPr>
-              <a:t>XOR</a:t>
-            </a:r>
-            <a:r>
-              <a:rPr lang="en-US" dirty="0" smtClean="0">
-                <a:solidFill>
-                  <a:srgbClr val="0000FF"/>
-                </a:solidFill>
-                <a:latin typeface="Comic Sans MS" pitchFamily="66" charset="0"/>
-              </a:rPr>
-              <a:t> NOT</a:t>
+              <a:t>XOR NOT</a:t>
             </a:r>
             <a:r>
               <a:rPr lang="en-US" sz="3600" dirty="0" smtClean="0">
@@ -12006,16 +11997,7 @@
                 </a:solidFill>
                 <a:latin typeface="Comic Sans MS" pitchFamily="66" charset="0"/>
               </a:rPr>
-              <a:t>        </a:t>
-            </a:r>
-            <a:r>
-              <a:rPr lang="en-US" sz="3600" dirty="0" smtClean="0">
-                <a:solidFill>
-                  <a:srgbClr val="008000"/>
-                </a:solidFill>
-                <a:latin typeface="Comic Sans MS" pitchFamily="66" charset="0"/>
-              </a:rPr>
-              <a:t>     T </a:t>
+              <a:t>             T </a:t>
             </a:r>
             <a:r>
               <a:rPr lang="en-US" sz="3600" dirty="0" smtClean="0">
@@ -12039,16 +12021,7 @@
                 </a:solidFill>
                 <a:latin typeface="Comic Sans MS" pitchFamily="66" charset="0"/>
               </a:rPr>
-              <a:t>            F     </a:t>
-            </a:r>
-            <a:r>
-              <a:rPr lang="en-US" sz="3600" dirty="0" smtClean="0">
-                <a:solidFill>
-                  <a:srgbClr val="FF0000"/>
-                </a:solidFill>
-                <a:latin typeface="Comic Sans MS" pitchFamily="66" charset="0"/>
-              </a:rPr>
-              <a:t>           </a:t>
+              <a:t>            F                </a:t>
             </a:r>
             <a:r>
               <a:rPr lang="en-US" sz="3600" dirty="0" smtClean="0">
@@ -20728,13 +20701,7 @@
               <a:rPr lang="en-US" dirty="0" smtClean="0">
                 <a:latin typeface="Comic Sans MS" pitchFamily="66" charset="0"/>
               </a:rPr>
-              <a:t> P</a:t>
-            </a:r>
-            <a:r>
-              <a:rPr lang="en-US" dirty="0" smtClean="0">
-                <a:latin typeface="Comic Sans MS" pitchFamily="66" charset="0"/>
-              </a:rPr>
-              <a:t> is </a:t>
+              <a:t> P is </a:t>
             </a:r>
             <a:r>
               <a:rPr lang="en-US" dirty="0" smtClean="0">
@@ -31262,16 +31229,21 @@
             <p:ph type="title"/>
           </p:nvPr>
         </p:nvSpPr>
-        <p:spPr/>
+        <p:spPr>
+          <a:xfrm>
+            <a:off x="1457070" y="304800"/>
+            <a:ext cx="7543800" cy="1143000"/>
+          </a:xfrm>
+        </p:spPr>
         <p:txBody>
           <a:bodyPr/>
           <a:lstStyle/>
           <a:p>
             <a:r>
-              <a:rPr lang="en-US" dirty="0" smtClean="0"/>
-              <a:t>Java Logical Expression</a:t>
-            </a:r>
-            <a:endParaRPr lang="en-US" dirty="0"/>
+              <a:rPr lang="en-US" sz="4000" dirty="0" smtClean="0"/>
+              <a:t>Other Applications</a:t>
+            </a:r>
+            <a:endParaRPr lang="en-US" sz="4000" dirty="0"/>
           </a:p>
         </p:txBody>
       </p:sp>
@@ -31283,7 +31255,7 @@
         </p:nvSpPr>
         <p:spPr>
           <a:xfrm>
-            <a:off x="181214" y="2671772"/>
+            <a:off x="181214" y="3858422"/>
             <a:ext cx="8781571" cy="1508105"/>
           </a:xfrm>
           <a:prstGeom prst="rect">
@@ -31390,7 +31362,7 @@
         </p:nvSpPr>
         <p:spPr>
           <a:xfrm>
-            <a:off x="2871018" y="2172924"/>
+            <a:off x="2898829" y="3183430"/>
             <a:ext cx="915635" cy="707886"/>
           </a:xfrm>
           <a:prstGeom prst="rect">
@@ -31434,7 +31406,7 @@
         </p:nvSpPr>
         <p:spPr>
           <a:xfrm>
-            <a:off x="5766621" y="2168006"/>
+            <a:off x="5636836" y="3206324"/>
             <a:ext cx="1338829" cy="707886"/>
           </a:xfrm>
           <a:prstGeom prst="rect">
@@ -31466,6 +31438,50 @@
                 </a:schemeClr>
               </a:solidFill>
               <a:latin typeface="Comic Sans MS" pitchFamily="66" charset="0"/>
+            </a:endParaRPr>
+          </a:p>
+        </p:txBody>
+      </p:sp>
+      <p:sp>
+        <p:nvSpPr>
+          <p:cNvPr id="9" name="TextBox 8"/>
+          <p:cNvSpPr txBox="1"/>
+          <p:nvPr/>
+        </p:nvSpPr>
+        <p:spPr>
+          <a:xfrm>
+            <a:off x="931820" y="1594561"/>
+            <a:ext cx="7464303" cy="830997"/>
+          </a:xfrm>
+          <a:prstGeom prst="rect">
+            <a:avLst/>
+          </a:prstGeom>
+          <a:noFill/>
+        </p:spPr>
+        <p:txBody>
+          <a:bodyPr wrap="none" rtlCol="0">
+            <a:spAutoFit/>
+          </a:bodyPr>
+          <a:lstStyle/>
+          <a:p>
+            <a:pPr algn="l"/>
+            <a:r>
+              <a:rPr lang="en-US" sz="4800" dirty="0" smtClean="0">
+                <a:latin typeface="Comic Sans MS"/>
+                <a:cs typeface="Comic Sans MS"/>
+              </a:rPr>
+              <a:t>Java Logical </a:t>
+            </a:r>
+            <a:r>
+              <a:rPr lang="en-US" sz="4800" dirty="0" smtClean="0">
+                <a:latin typeface="Comic Sans MS"/>
+                <a:cs typeface="Comic Sans MS"/>
+              </a:rPr>
+              <a:t>Expressions:</a:t>
+            </a:r>
+            <a:endParaRPr lang="en-US" sz="4800" dirty="0" smtClean="0">
+              <a:latin typeface="Comic Sans MS"/>
+              <a:cs typeface="Comic Sans MS"/>
             </a:endParaRPr>
           </a:p>
         </p:txBody>
@@ -31481,9 +31497,178 @@
   <p:timing>
     <p:tnLst>
       <p:par>
-        <p:cTn id="1" dur="indefinite" restart="never" nodeType="tmRoot"/>
+        <p:cTn id="1" dur="indefinite" restart="never" nodeType="tmRoot">
+          <p:childTnLst>
+            <p:seq concurrent="1" nextAc="seek">
+              <p:cTn id="2" dur="indefinite" nodeType="mainSeq">
+                <p:childTnLst>
+                  <p:par>
+                    <p:cTn id="3" fill="hold">
+                      <p:stCondLst>
+                        <p:cond delay="indefinite"/>
+                      </p:stCondLst>
+                      <p:childTnLst>
+                        <p:par>
+                          <p:cTn id="4" fill="hold">
+                            <p:stCondLst>
+                              <p:cond delay="0"/>
+                            </p:stCondLst>
+                            <p:childTnLst>
+                              <p:par>
+                                <p:cTn id="5" presetID="22" presetClass="entr" presetSubtype="1" fill="hold" grpId="0" nodeType="clickEffect">
+                                  <p:stCondLst>
+                                    <p:cond delay="0"/>
+                                  </p:stCondLst>
+                                  <p:childTnLst>
+                                    <p:set>
+                                      <p:cBhvr>
+                                        <p:cTn id="6" dur="1" fill="hold">
+                                          <p:stCondLst>
+                                            <p:cond delay="0"/>
+                                          </p:stCondLst>
+                                        </p:cTn>
+                                        <p:tgtEl>
+                                          <p:spTgt spid="7"/>
+                                        </p:tgtEl>
+                                        <p:attrNameLst>
+                                          <p:attrName>style.visibility</p:attrName>
+                                        </p:attrNameLst>
+                                      </p:cBhvr>
+                                      <p:to>
+                                        <p:strVal val="visible"/>
+                                      </p:to>
+                                    </p:set>
+                                    <p:animEffect transition="in" filter="wipe(up)">
+                                      <p:cBhvr>
+                                        <p:cTn id="7" dur="500"/>
+                                        <p:tgtEl>
+                                          <p:spTgt spid="7"/>
+                                        </p:tgtEl>
+                                      </p:cBhvr>
+                                    </p:animEffect>
+                                  </p:childTnLst>
+                                </p:cTn>
+                              </p:par>
+                            </p:childTnLst>
+                          </p:cTn>
+                        </p:par>
+                      </p:childTnLst>
+                    </p:cTn>
+                  </p:par>
+                  <p:par>
+                    <p:cTn id="8" fill="hold">
+                      <p:stCondLst>
+                        <p:cond delay="indefinite"/>
+                      </p:stCondLst>
+                      <p:childTnLst>
+                        <p:par>
+                          <p:cTn id="9" fill="hold">
+                            <p:stCondLst>
+                              <p:cond delay="0"/>
+                            </p:stCondLst>
+                            <p:childTnLst>
+                              <p:par>
+                                <p:cTn id="10" presetID="10" presetClass="entr" presetSubtype="0" fill="hold" grpId="0" nodeType="clickEffect">
+                                  <p:stCondLst>
+                                    <p:cond delay="0"/>
+                                  </p:stCondLst>
+                                  <p:childTnLst>
+                                    <p:set>
+                                      <p:cBhvr>
+                                        <p:cTn id="11" dur="1" fill="hold">
+                                          <p:stCondLst>
+                                            <p:cond delay="0"/>
+                                          </p:stCondLst>
+                                        </p:cTn>
+                                        <p:tgtEl>
+                                          <p:spTgt spid="8"/>
+                                        </p:tgtEl>
+                                        <p:attrNameLst>
+                                          <p:attrName>style.visibility</p:attrName>
+                                        </p:attrNameLst>
+                                      </p:cBhvr>
+                                      <p:to>
+                                        <p:strVal val="visible"/>
+                                      </p:to>
+                                    </p:set>
+                                    <p:animEffect transition="in" filter="fade">
+                                      <p:cBhvr>
+                                        <p:cTn id="12" dur="500"/>
+                                        <p:tgtEl>
+                                          <p:spTgt spid="8"/>
+                                        </p:tgtEl>
+                                      </p:cBhvr>
+                                    </p:animEffect>
+                                  </p:childTnLst>
+                                </p:cTn>
+                              </p:par>
+                              <p:par>
+                                <p:cTn id="13" presetID="10" presetClass="entr" presetSubtype="0" fill="hold" grpId="0" nodeType="withEffect">
+                                  <p:stCondLst>
+                                    <p:cond delay="0"/>
+                                  </p:stCondLst>
+                                  <p:childTnLst>
+                                    <p:set>
+                                      <p:cBhvr>
+                                        <p:cTn id="14" dur="1" fill="hold">
+                                          <p:stCondLst>
+                                            <p:cond delay="0"/>
+                                          </p:stCondLst>
+                                        </p:cTn>
+                                        <p:tgtEl>
+                                          <p:spTgt spid="5"/>
+                                        </p:tgtEl>
+                                        <p:attrNameLst>
+                                          <p:attrName>style.visibility</p:attrName>
+                                        </p:attrNameLst>
+                                      </p:cBhvr>
+                                      <p:to>
+                                        <p:strVal val="visible"/>
+                                      </p:to>
+                                    </p:set>
+                                    <p:animEffect transition="in" filter="fade">
+                                      <p:cBhvr>
+                                        <p:cTn id="15" dur="500"/>
+                                        <p:tgtEl>
+                                          <p:spTgt spid="5"/>
+                                        </p:tgtEl>
+                                      </p:cBhvr>
+                                    </p:animEffect>
+                                  </p:childTnLst>
+                                </p:cTn>
+                              </p:par>
+                            </p:childTnLst>
+                          </p:cTn>
+                        </p:par>
+                      </p:childTnLst>
+                    </p:cTn>
+                  </p:par>
+                </p:childTnLst>
+              </p:cTn>
+              <p:prevCondLst>
+                <p:cond evt="onPrev" delay="0">
+                  <p:tgtEl>
+                    <p:sldTgt/>
+                  </p:tgtEl>
+                </p:cond>
+              </p:prevCondLst>
+              <p:nextCondLst>
+                <p:cond evt="onNext" delay="0">
+                  <p:tgtEl>
+                    <p:sldTgt/>
+                  </p:tgtEl>
+                </p:cond>
+              </p:nextCondLst>
+            </p:seq>
+          </p:childTnLst>
+        </p:cTn>
       </p:par>
     </p:tnLst>
+    <p:bldLst>
+      <p:bldP spid="7" grpId="0"/>
+      <p:bldP spid="5" grpId="0"/>
+      <p:bldP spid="8" grpId="0"/>
+    </p:bldLst>
   </p:timing>
 </p:sld>
 </file>
@@ -32247,8 +32432,8 @@
         </p:nvSpPr>
         <p:spPr>
           <a:xfrm>
-            <a:off x="2401623" y="276412"/>
-            <a:ext cx="4354015" cy="951886"/>
+            <a:off x="1678539" y="239328"/>
+            <a:ext cx="6785252" cy="1021487"/>
           </a:xfrm>
         </p:spPr>
         <p:txBody>
@@ -32257,7 +32442,11 @@
           <a:p>
             <a:r>
               <a:rPr lang="en-US" sz="4000" dirty="0" smtClean="0"/>
-              <a:t>Digital Logic</a:t>
+              <a:t>Application:  Digital </a:t>
+            </a:r>
+            <a:r>
+              <a:rPr lang="en-US" sz="4000" dirty="0" smtClean="0"/>
+              <a:t>Logic</a:t>
             </a:r>
             <a:endParaRPr lang="en-US" sz="4000" dirty="0"/>
           </a:p>
@@ -35195,7 +35384,7 @@
 </file>
 
 <file path=ppt/slides/slide6.xml><?xml version="1.0" encoding="utf-8"?>
-<p:sld xmlns:a="http://schemas.openxmlformats.org/drawingml/2006/main" xmlns:r="http://schemas.openxmlformats.org/officeDocument/2006/relationships" xmlns:mc="http://schemas.openxmlformats.org/markup-compatibility/2006" xmlns:mv="urn:schemas-microsoft-com:mac:vml" xmlns:p="http://schemas.openxmlformats.org/presentationml/2006/main" mc:Ignorable="mv" mc:PreserveAttributes="mv:*">
+<p:sld xmlns:a="http://schemas.openxmlformats.org/drawingml/2006/main" xmlns:r="http://schemas.openxmlformats.org/officeDocument/2006/relationships" xmlns:mc="http://schemas.openxmlformats.org/markup-compatibility/2006" xmlns:mv="urn:schemas-microsoft-com:mac:vml" xmlns:p="http://schemas.openxmlformats.org/presentationml/2006/main" mc:Ignorable="mv" mc:PreserveAttributes="mv:*" show="0">
   <p:cSld>
     <p:spTree>
       <p:nvGrpSpPr>
@@ -37944,13 +38133,7 @@
               <a:rPr lang="en-US" dirty="0" smtClean="0">
                 <a:latin typeface="Comic Sans MS" pitchFamily="66" charset="0"/>
               </a:rPr>
-              <a:t>P,Q are</a:t>
-            </a:r>
-            <a:r>
-              <a:rPr lang="en-US" dirty="0" smtClean="0">
-                <a:latin typeface="Comic Sans MS" pitchFamily="66" charset="0"/>
-              </a:rPr>
-              <a:t> </a:t>
+              <a:t>P,Q are </a:t>
             </a:r>
             <a:r>
               <a:rPr lang="en-US" dirty="0" smtClean="0">
@@ -37961,12 +38144,6 @@
               </a:rPr>
               <a:t>T</a:t>
             </a:r>
-            <a:endParaRPr lang="en-US" dirty="0" smtClean="0">
-              <a:solidFill>
-                <a:srgbClr val="006600"/>
-              </a:solidFill>
-              <a:latin typeface="Comic Sans MS" pitchFamily="66" charset="0"/>
-            </a:endParaRPr>
           </a:p>
         </p:txBody>
       </p:sp>

</xml_diff>